<commit_message>
added new lectures drafts
</commit_message>
<xml_diff>
--- a/lectures/lecture-25/draft.pptx
+++ b/lectures/lecture-25/draft.pptx
@@ -10,7 +10,7 @@
   <p:sldIdLst>
     <p:sldId id="425" r:id="rId2"/>
     <p:sldId id="465" r:id="rId3"/>
-    <p:sldId id="442" r:id="rId4"/>
+    <p:sldId id="466" r:id="rId4"/>
   </p:sldIdLst>
   <p:sldSz cx="12192000" cy="6858000"/>
   <p:notesSz cx="6858000" cy="9144000"/>
@@ -199,7 +199,7 @@
           <a:p>
             <a:fld id="{9F16E362-832A-824E-B063-25F5DE831740}" type="datetimeFigureOut">
               <a:rPr lang="en-RU" smtClean="0"/>
-              <a:t>17.04.2022</a:t>
+              <a:t>02.05.2022</a:t>
             </a:fld>
             <a:endParaRPr lang="en-RU"/>
           </a:p>
@@ -628,6 +628,90 @@
     <p:extLst>
       <p:ext uri="{BB962C8B-B14F-4D97-AF65-F5344CB8AC3E}">
         <p14:creationId xmlns:p14="http://schemas.microsoft.com/office/powerpoint/2010/main" val="3619124818"/>
+      </p:ext>
+    </p:extLst>
+  </p:cSld>
+  <p:clrMapOvr>
+    <a:masterClrMapping/>
+  </p:clrMapOvr>
+</p:notes>
+</file>
+
+<file path=ppt/notesSlides/notesSlide3.xml><?xml version="1.0" encoding="utf-8"?>
+<p:notes xmlns:a="http://schemas.openxmlformats.org/drawingml/2006/main" xmlns:r="http://schemas.openxmlformats.org/officeDocument/2006/relationships" xmlns:p="http://schemas.openxmlformats.org/presentationml/2006/main">
+  <p:cSld>
+    <p:spTree>
+      <p:nvGrpSpPr>
+        <p:cNvPr id="1" name=""/>
+        <p:cNvGrpSpPr/>
+        <p:nvPr/>
+      </p:nvGrpSpPr>
+      <p:grpSpPr>
+        <a:xfrm>
+          <a:off x="0" y="0"/>
+          <a:ext cx="0" cy="0"/>
+          <a:chOff x="0" y="0"/>
+          <a:chExt cx="0" cy="0"/>
+        </a:xfrm>
+      </p:grpSpPr>
+      <p:sp>
+        <p:nvSpPr>
+          <p:cNvPr id="2" name="Slide Image Placeholder 1"/>
+          <p:cNvSpPr>
+            <a:spLocks noGrp="1" noRot="1" noChangeAspect="1"/>
+          </p:cNvSpPr>
+          <p:nvPr>
+            <p:ph type="sldImg"/>
+          </p:nvPr>
+        </p:nvSpPr>
+        <p:spPr/>
+      </p:sp>
+      <p:sp>
+        <p:nvSpPr>
+          <p:cNvPr id="3" name="Notes Placeholder 2"/>
+          <p:cNvSpPr>
+            <a:spLocks noGrp="1"/>
+          </p:cNvSpPr>
+          <p:nvPr>
+            <p:ph type="body" idx="1"/>
+          </p:nvPr>
+        </p:nvSpPr>
+        <p:spPr/>
+        <p:txBody>
+          <a:bodyPr/>
+          <a:lstStyle/>
+          <a:p>
+            <a:endParaRPr lang="en-RU"/>
+          </a:p>
+        </p:txBody>
+      </p:sp>
+      <p:sp>
+        <p:nvSpPr>
+          <p:cNvPr id="4" name="Slide Number Placeholder 3"/>
+          <p:cNvSpPr>
+            <a:spLocks noGrp="1"/>
+          </p:cNvSpPr>
+          <p:nvPr>
+            <p:ph type="sldNum" sz="quarter" idx="5"/>
+          </p:nvPr>
+        </p:nvSpPr>
+        <p:spPr/>
+        <p:txBody>
+          <a:bodyPr/>
+          <a:lstStyle/>
+          <a:p>
+            <a:fld id="{45EAD37F-4CAA-4C4E-B967-8FF85B62072E}" type="slidenum">
+              <a:rPr lang="en-RU" smtClean="0"/>
+              <a:t>3</a:t>
+            </a:fld>
+            <a:endParaRPr lang="en-RU"/>
+          </a:p>
+        </p:txBody>
+      </p:sp>
+    </p:spTree>
+    <p:extLst>
+      <p:ext uri="{BB962C8B-B14F-4D97-AF65-F5344CB8AC3E}">
+        <p14:creationId xmlns:p14="http://schemas.microsoft.com/office/powerpoint/2010/main" val="2759303581"/>
       </p:ext>
     </p:extLst>
   </p:cSld>
@@ -2149,7 +2233,7 @@
               <a:rPr lang="en-US" sz="4800" dirty="0">
                 <a:latin typeface="Helvetica" pitchFamily="2" charset="0"/>
               </a:rPr>
-              <a:t>Metaprogramming</a:t>
+              <a:t>Type deduction</a:t>
             </a:r>
             <a:endParaRPr lang="en-US" sz="2800" dirty="0">
               <a:latin typeface="Helvetica" pitchFamily="2" charset="0"/>
@@ -2418,7 +2502,7 @@
           <a:lstStyle/>
           <a:p>
             <a:r>
-              <a:rPr lang="en-US" sz="3600">
+              <a:rPr lang="en-US" sz="3600" dirty="0">
                 <a:solidFill>
                   <a:schemeClr val="accent4"/>
                 </a:solidFill>
@@ -2426,19 +2510,13 @@
               </a:rPr>
               <a:t>Lecture 25</a:t>
             </a:r>
-            <a:endParaRPr lang="en-US" sz="3600" dirty="0">
-              <a:solidFill>
-                <a:schemeClr val="accent4"/>
-              </a:solidFill>
-              <a:latin typeface="Helvetica" pitchFamily="2" charset="0"/>
-            </a:endParaRPr>
           </a:p>
           <a:p>
             <a:r>
               <a:rPr lang="en-US" sz="4800" dirty="0">
                 <a:latin typeface="Helvetica" pitchFamily="2" charset="0"/>
               </a:rPr>
-              <a:t>Metaprogramming</a:t>
+              <a:t>Type deduction</a:t>
             </a:r>
             <a:endParaRPr lang="en-US" sz="2800" dirty="0">
               <a:latin typeface="Helvetica" pitchFamily="2" charset="0"/>
@@ -2519,7 +2597,7 @@
     </p:spTree>
     <p:extLst>
       <p:ext uri="{BB962C8B-B14F-4D97-AF65-F5344CB8AC3E}">
-        <p14:creationId xmlns:p14="http://schemas.microsoft.com/office/powerpoint/2010/main" val="2103123847"/>
+        <p14:creationId xmlns:p14="http://schemas.microsoft.com/office/powerpoint/2010/main" val="622142057"/>
       </p:ext>
     </p:extLst>
   </p:cSld>

</xml_diff>